<commit_message>
Made some front-end improvements
</commit_message>
<xml_diff>
--- a/Материали/OMCS.pptx
+++ b/Материали/OMCS.pptx
@@ -12380,8 +12380,8 @@
         </p:nvSpPr>
         <p:spPr>
           <a:xfrm>
-            <a:off x="3943123" y="2737712"/>
-            <a:ext cx="1392665" cy="423575"/>
+            <a:off x="3492708" y="2571750"/>
+            <a:ext cx="2463835" cy="423575"/>
           </a:xfrm>
           <a:prstGeom prst="rect">
             <a:avLst/>
@@ -12393,32 +12393,19 @@
           </a:bodyPr>
           <a:lstStyle/>
           <a:p>
-            <a:pPr marL="0" lvl="0" indent="0" algn="l" rtl="0">
-              <a:spcBef>
-                <a:spcPts val="0"/>
-              </a:spcBef>
-              <a:spcAft>
-                <a:spcPts val="0"/>
-              </a:spcAft>
-              <a:buNone/>
-            </a:pPr>
             <a:r>
               <a:rPr lang="bg-BG" sz="1800" dirty="0">
                 <a:solidFill>
                   <a:schemeClr val="lt1"/>
                 </a:solidFill>
               </a:rPr>
-              <a:t>Изкуствен интелект, базиран на </a:t>
+              <a:t>Възможност за проверка на програмен код</a:t>
             </a:r>
-            <a:r>
-              <a:rPr lang="en-US" sz="1800" dirty="0">
-                <a:solidFill>
-                  <a:schemeClr val="lt1"/>
-                </a:solidFill>
-              </a:rPr>
-              <a:t>ML. NET</a:t>
-            </a:r>
-            <a:endParaRPr dirty="0"/>
+            <a:endParaRPr sz="1800" dirty="0">
+              <a:solidFill>
+                <a:schemeClr val="lt1"/>
+              </a:solidFill>
+            </a:endParaRPr>
           </a:p>
         </p:txBody>
       </p:sp>

</xml_diff>